<commit_message>
Added logo to script, will appear on title slide. Needs to be arranged by user. Regenerated report...
</commit_message>
<xml_diff>
--- a/dailyBrief2017054.pptx
+++ b/dailyBrief2017054.pptx
@@ -440,7 +440,7 @@
     </p:spTree>
     <p:extLst>
       <p:ext uri="{BB962C8B-B14F-4D97-AF65-F5344CB8AC3E}">
-        <p14:creationId xmlns:p14="http://schemas.microsoft.com/office/powerpoint/2010/main" val="3331965515"/>
+        <p14:creationId xmlns:p14="http://schemas.microsoft.com/office/powerpoint/2010/main" val="2366154409"/>
       </p:ext>
     </p:extLst>
   </p:cSld>
@@ -711,7 +711,7 @@
     </p:spTree>
     <p:extLst>
       <p:ext uri="{BB962C8B-B14F-4D97-AF65-F5344CB8AC3E}">
-        <p14:creationId xmlns:p14="http://schemas.microsoft.com/office/powerpoint/2010/main" val="2373078994"/>
+        <p14:creationId xmlns:p14="http://schemas.microsoft.com/office/powerpoint/2010/main" val="2169215922"/>
       </p:ext>
     </p:extLst>
   </p:cSld>
@@ -778,7 +778,7 @@
     </p:spTree>
     <p:extLst>
       <p:ext uri="{BB962C8B-B14F-4D97-AF65-F5344CB8AC3E}">
-        <p14:creationId xmlns:p14="http://schemas.microsoft.com/office/powerpoint/2010/main" val="3372371098"/>
+        <p14:creationId xmlns:p14="http://schemas.microsoft.com/office/powerpoint/2010/main" val="138736799"/>
       </p:ext>
     </p:extLst>
   </p:cSld>
@@ -1040,7 +1040,7 @@
     </p:spTree>
     <p:extLst>
       <p:ext uri="{BB962C8B-B14F-4D97-AF65-F5344CB8AC3E}">
-        <p14:creationId xmlns:p14="http://schemas.microsoft.com/office/powerpoint/2010/main" val="177578261"/>
+        <p14:creationId xmlns:p14="http://schemas.microsoft.com/office/powerpoint/2010/main" val="1949348916"/>
       </p:ext>
     </p:extLst>
   </p:cSld>
@@ -1288,7 +1288,7 @@
     </p:spTree>
     <p:extLst>
       <p:ext uri="{BB962C8B-B14F-4D97-AF65-F5344CB8AC3E}">
-        <p14:creationId xmlns:p14="http://schemas.microsoft.com/office/powerpoint/2010/main" val="823495263"/>
+        <p14:creationId xmlns:p14="http://schemas.microsoft.com/office/powerpoint/2010/main" val="3552916188"/>
       </p:ext>
     </p:extLst>
   </p:cSld>
@@ -1474,7 +1474,7 @@
     </p:spTree>
     <p:extLst>
       <p:ext uri="{BB962C8B-B14F-4D97-AF65-F5344CB8AC3E}">
-        <p14:creationId xmlns:p14="http://schemas.microsoft.com/office/powerpoint/2010/main" val="1208487540"/>
+        <p14:creationId xmlns:p14="http://schemas.microsoft.com/office/powerpoint/2010/main" val="3168356249"/>
       </p:ext>
     </p:extLst>
   </p:cSld>
@@ -1636,7 +1636,7 @@
     </p:spTree>
     <p:extLst>
       <p:ext uri="{BB962C8B-B14F-4D97-AF65-F5344CB8AC3E}">
-        <p14:creationId xmlns:p14="http://schemas.microsoft.com/office/powerpoint/2010/main" val="2453121423"/>
+        <p14:creationId xmlns:p14="http://schemas.microsoft.com/office/powerpoint/2010/main" val="3946971315"/>
       </p:ext>
     </p:extLst>
   </p:cSld>
@@ -1878,7 +1878,7 @@
     </p:spTree>
     <p:extLst>
       <p:ext uri="{BB962C8B-B14F-4D97-AF65-F5344CB8AC3E}">
-        <p14:creationId xmlns:p14="http://schemas.microsoft.com/office/powerpoint/2010/main" val="777486060"/>
+        <p14:creationId xmlns:p14="http://schemas.microsoft.com/office/powerpoint/2010/main" val="103023553"/>
       </p:ext>
     </p:extLst>
   </p:cSld>
@@ -2221,7 +2221,7 @@
     </p:spTree>
     <p:extLst>
       <p:ext uri="{BB962C8B-B14F-4D97-AF65-F5344CB8AC3E}">
-        <p14:creationId xmlns:p14="http://schemas.microsoft.com/office/powerpoint/2010/main" val="2080336291"/>
+        <p14:creationId xmlns:p14="http://schemas.microsoft.com/office/powerpoint/2010/main" val="4227856526"/>
       </p:ext>
     </p:extLst>
   </p:cSld>
@@ -2374,7 +2374,7 @@
     </p:spTree>
     <p:extLst>
       <p:ext uri="{BB962C8B-B14F-4D97-AF65-F5344CB8AC3E}">
-        <p14:creationId xmlns:p14="http://schemas.microsoft.com/office/powerpoint/2010/main" val="83192064"/>
+        <p14:creationId xmlns:p14="http://schemas.microsoft.com/office/powerpoint/2010/main" val="3740895079"/>
       </p:ext>
     </p:extLst>
   </p:cSld>
@@ -2631,7 +2631,7 @@
     </p:spTree>
     <p:extLst>
       <p:ext uri="{BB962C8B-B14F-4D97-AF65-F5344CB8AC3E}">
-        <p14:creationId xmlns:p14="http://schemas.microsoft.com/office/powerpoint/2010/main" val="9809359"/>
+        <p14:creationId xmlns:p14="http://schemas.microsoft.com/office/powerpoint/2010/main" val="3431910576"/>
       </p:ext>
     </p:extLst>
   </p:cSld>
@@ -2793,7 +2793,7 @@
     </p:spTree>
     <p:extLst>
       <p:ext uri="{BB962C8B-B14F-4D97-AF65-F5344CB8AC3E}">
-        <p14:creationId xmlns:p14="http://schemas.microsoft.com/office/powerpoint/2010/main" val="3953096678"/>
+        <p14:creationId xmlns:p14="http://schemas.microsoft.com/office/powerpoint/2010/main" val="892038576"/>
       </p:ext>
     </p:extLst>
   </p:cSld>
@@ -3236,7 +3236,7 @@
     </p:spTree>
     <p:extLst>
       <p:ext uri="{BB962C8B-B14F-4D97-AF65-F5344CB8AC3E}">
-        <p14:creationId xmlns:p14="http://schemas.microsoft.com/office/powerpoint/2010/main" val="3418688604"/>
+        <p14:creationId xmlns:p14="http://schemas.microsoft.com/office/powerpoint/2010/main" val="4003664303"/>
       </p:ext>
     </p:extLst>
   </p:cSld>
@@ -3348,7 +3348,7 @@
     </p:spTree>
     <p:extLst>
       <p:ext uri="{BB962C8B-B14F-4D97-AF65-F5344CB8AC3E}">
-        <p14:creationId xmlns:p14="http://schemas.microsoft.com/office/powerpoint/2010/main" val="3030669060"/>
+        <p14:creationId xmlns:p14="http://schemas.microsoft.com/office/powerpoint/2010/main" val="2169574948"/>
       </p:ext>
     </p:extLst>
   </p:cSld>
@@ -4179,7 +4179,7 @@
     </p:spTree>
     <p:extLst>
       <p:ext uri="{BB962C8B-B14F-4D97-AF65-F5344CB8AC3E}">
-        <p14:creationId xmlns:p14="http://schemas.microsoft.com/office/powerpoint/2010/main" val="1855480103"/>
+        <p14:creationId xmlns:p14="http://schemas.microsoft.com/office/powerpoint/2010/main" val="3842689819"/>
       </p:ext>
     </p:extLst>
   </p:cSld>
@@ -4676,22 +4676,8 @@
           <a:lstStyle/>
           <a:p>
             <a:r>
-              <a:rPr dirty="0"/>
-              <a:t>Daily Brief: </a:t>
-            </a:r>
-            <a:r>
-              <a:rPr dirty="0" smtClean="0"/>
-              <a:t>5/</a:t>
-            </a:r>
-            <a:r>
-              <a:rPr lang="en-US" dirty="0" smtClean="0"/>
-              <a:t>5</a:t>
-            </a:r>
-            <a:r>
-              <a:rPr dirty="0" smtClean="0"/>
-              <a:t>/2017</a:t>
-            </a:r>
-            <a:endParaRPr dirty="0"/>
+              <a:t>Daily Brief: 5/4/2017</a:t>
+            </a:r>
           </a:p>
         </p:txBody>
       </p:sp>
@@ -4711,43 +4697,29 @@
           <a:lstStyle/>
           <a:p>
             <a:r>
-              <a:rPr lang="en-US" smtClean="0"/>
-              <a:t>CPT</a:t>
-            </a:r>
-            <a:r>
-              <a:rPr smtClean="0"/>
-              <a:t> </a:t>
-            </a:r>
-            <a:r>
-              <a:t>Devens</a:t>
+              <a:t>CPT Devens</a:t>
             </a:r>
           </a:p>
         </p:txBody>
       </p:sp>
       <p:pic>
         <p:nvPicPr>
-          <p:cNvPr id="4" name="Picture 3"/>
+          <p:cNvPr id="4" name="Picture 3" descr="logo_clear.png"/>
           <p:cNvPicPr>
             <a:picLocks noChangeAspect="1"/>
           </p:cNvPicPr>
           <p:nvPr/>
         </p:nvPicPr>
         <p:blipFill>
-          <a:blip r:embed="rId2">
-            <a:extLst>
-              <a:ext uri="{28A0092B-C50C-407E-A947-70E740481C1C}">
-                <a14:useLocalDpi xmlns:a14="http://schemas.microsoft.com/office/drawing/2010/main" val="0"/>
-              </a:ext>
-            </a:extLst>
-          </a:blip>
+          <a:blip r:embed="rId2"/>
           <a:stretch>
             <a:fillRect/>
           </a:stretch>
         </p:blipFill>
         <p:spPr>
           <a:xfrm>
-            <a:off x="8557404" y="6031581"/>
-            <a:ext cx="586596" cy="550946"/>
+            <a:off x="8452507" y="5993978"/>
+            <a:ext cx="584140" cy="548640"/>
           </a:xfrm>
           <a:prstGeom prst="rect">
             <a:avLst/>
@@ -4812,9 +4784,7 @@
         </p:nvSpPr>
         <p:spPr/>
         <p:txBody>
-          <a:bodyPr>
-            <a:normAutofit/>
-          </a:bodyPr>
+          <a:bodyPr/>
           <a:lstStyle/>
           <a:p>
             <a:r>
@@ -4891,9 +4861,7 @@
         </p:nvSpPr>
         <p:spPr/>
         <p:txBody>
-          <a:bodyPr>
-            <a:normAutofit/>
-          </a:bodyPr>
+          <a:bodyPr/>
           <a:lstStyle/>
           <a:p>
             <a:r>
@@ -5057,17 +5025,17 @@
           <a:lstStyle/>
           <a:p>
             <a:r>
-              <a:t>(ENG-WSL) Arsenal (W) vs Liverpool (W): 4-4 - Goal for Liverpool (W)</a:t>
-            </a:r>
-          </a:p>
-          <a:p>
-            <a:r>
-              <a:t>(UEFA-SF) Celta Vigo vs Manchester United: 0-0 - 2nd Half Started</a:t>
-            </a:r>
-          </a:p>
-          <a:p>
-            <a:r>
-              <a:t>(PER-TV) U. Comercio vs Inti Gas Deportes: 0-2 - Match Finished</a:t>
+              <a:t>(ENG-SF) Millwall FC vs Scunthorpe Utd: 0-0 - Match Finished</a:t>
+            </a:r>
+          </a:p>
+          <a:p>
+            <a:r>
+              <a:t>(ENG-SF) Bradford City vs Fleetwood Town: 1-0 - Match Finished</a:t>
+            </a:r>
+          </a:p>
+          <a:p>
+            <a:r>
+              <a:t>(PER-TV) Comerciantes Unidos vs Deportivo Municipal: 0-1 - Goal for Deportivo Municipal</a:t>
             </a:r>
           </a:p>
         </p:txBody>
@@ -5130,196 +5098,46 @@
         </p:nvSpPr>
         <p:spPr/>
         <p:txBody>
-          <a:bodyPr>
-            <a:normAutofit/>
-          </a:bodyPr>
+          <a:bodyPr/>
           <a:lstStyle/>
           <a:p>
             <a:r>
-              <a:rPr dirty="0"/>
-              <a:t>THU </a:t>
-            </a:r>
-            <a:r>
-              <a:rPr dirty="0" smtClean="0"/>
-              <a:t>17:</a:t>
-            </a:r>
-            <a:r>
-              <a:rPr lang="en-US" dirty="0" smtClean="0"/>
-              <a:t>0</a:t>
-            </a:r>
-            <a:r>
-              <a:rPr dirty="0" smtClean="0"/>
-              <a:t>0 </a:t>
-            </a:r>
-            <a:r>
-              <a:rPr dirty="0"/>
-              <a:t>&gt; Rain</a:t>
-            </a:r>
-          </a:p>
-          <a:p>
-            <a:r>
-              <a:rPr dirty="0"/>
-              <a:t>FRI </a:t>
-            </a:r>
-            <a:r>
-              <a:rPr dirty="0" smtClean="0"/>
-              <a:t>20:</a:t>
-            </a:r>
-            <a:r>
-              <a:rPr lang="en-US" dirty="0" smtClean="0"/>
-              <a:t>0</a:t>
-            </a:r>
-            <a:r>
-              <a:rPr dirty="0" smtClean="0"/>
-              <a:t>0 </a:t>
-            </a:r>
-            <a:r>
-              <a:rPr dirty="0"/>
-              <a:t>&gt; Rain</a:t>
-            </a:r>
-          </a:p>
-          <a:p>
-            <a:r>
-              <a:rPr dirty="0"/>
-              <a:t>FRI </a:t>
-            </a:r>
-            <a:r>
-              <a:rPr dirty="0" smtClean="0"/>
-              <a:t>23:</a:t>
-            </a:r>
-            <a:r>
-              <a:rPr lang="en-US" dirty="0" smtClean="0"/>
-              <a:t>0</a:t>
-            </a:r>
-            <a:r>
-              <a:rPr dirty="0" smtClean="0"/>
-              <a:t>0 </a:t>
-            </a:r>
-            <a:r>
-              <a:rPr dirty="0"/>
-              <a:t>&gt; Rain</a:t>
-            </a:r>
-          </a:p>
-          <a:p>
-            <a:r>
-              <a:rPr dirty="0"/>
-              <a:t>FRI </a:t>
-            </a:r>
-            <a:r>
-              <a:rPr lang="en-US" dirty="0" smtClean="0"/>
-              <a:t>0</a:t>
-            </a:r>
-            <a:r>
-              <a:rPr dirty="0" smtClean="0"/>
-              <a:t>2:</a:t>
-            </a:r>
-            <a:r>
-              <a:rPr lang="en-US" dirty="0" smtClean="0"/>
-              <a:t>0</a:t>
-            </a:r>
-            <a:r>
-              <a:rPr dirty="0" smtClean="0"/>
-              <a:t>0 </a:t>
-            </a:r>
-            <a:r>
-              <a:rPr dirty="0"/>
-              <a:t>&gt; Rain</a:t>
-            </a:r>
-          </a:p>
-          <a:p>
-            <a:r>
-              <a:rPr dirty="0"/>
-              <a:t>FRI </a:t>
-            </a:r>
-            <a:r>
-              <a:rPr lang="en-US" dirty="0" smtClean="0"/>
-              <a:t>0</a:t>
-            </a:r>
-            <a:r>
-              <a:rPr dirty="0" smtClean="0"/>
-              <a:t>5:</a:t>
-            </a:r>
-            <a:r>
-              <a:rPr lang="en-US" dirty="0" smtClean="0"/>
-              <a:t>0</a:t>
-            </a:r>
-            <a:r>
-              <a:rPr dirty="0" smtClean="0"/>
-              <a:t>0 </a:t>
-            </a:r>
-            <a:r>
-              <a:rPr dirty="0"/>
-              <a:t>&gt; Rain</a:t>
-            </a:r>
-          </a:p>
-          <a:p>
-            <a:r>
-              <a:rPr dirty="0"/>
-              <a:t>FRI </a:t>
-            </a:r>
-            <a:r>
-              <a:rPr lang="en-US" dirty="0" smtClean="0"/>
-              <a:t>0</a:t>
-            </a:r>
-            <a:r>
-              <a:rPr dirty="0" smtClean="0"/>
-              <a:t>8:0</a:t>
-            </a:r>
-            <a:r>
-              <a:rPr lang="en-US" dirty="0" smtClean="0"/>
-              <a:t>0</a:t>
-            </a:r>
-            <a:r>
-              <a:rPr dirty="0" smtClean="0"/>
-              <a:t> </a:t>
-            </a:r>
-            <a:r>
-              <a:rPr dirty="0"/>
-              <a:t>&gt; Rain</a:t>
-            </a:r>
-          </a:p>
-          <a:p>
-            <a:r>
-              <a:rPr dirty="0"/>
-              <a:t>FRI </a:t>
-            </a:r>
-            <a:r>
-              <a:rPr dirty="0" smtClean="0"/>
-              <a:t>11:</a:t>
-            </a:r>
-            <a:r>
-              <a:rPr lang="en-US" dirty="0" smtClean="0"/>
-              <a:t>0</a:t>
-            </a:r>
-            <a:r>
-              <a:rPr dirty="0" smtClean="0"/>
-              <a:t>0 </a:t>
-            </a:r>
-            <a:r>
-              <a:rPr dirty="0"/>
-              <a:t>&gt; Clouds</a:t>
-            </a:r>
-          </a:p>
-          <a:p>
-            <a:r>
-              <a:rPr dirty="0"/>
-              <a:t>FRI </a:t>
-            </a:r>
-            <a:r>
-              <a:rPr dirty="0" smtClean="0"/>
-              <a:t>14:</a:t>
-            </a:r>
-            <a:r>
-              <a:rPr lang="en-US" dirty="0" smtClean="0"/>
-              <a:t>0</a:t>
-            </a:r>
-            <a:r>
-              <a:rPr dirty="0" smtClean="0"/>
-              <a:t>0 </a:t>
-            </a:r>
-            <a:r>
-              <a:rPr dirty="0"/>
-              <a:t>&gt; Clouds</a:t>
+              <a:t>THU 17:0 &gt; Rain</a:t>
+            </a:r>
+          </a:p>
+          <a:p>
+            <a:r>
+              <a:t>FRI 20:0 &gt; Rain</a:t>
+            </a:r>
+          </a:p>
+          <a:p>
+            <a:r>
+              <a:t>FRI 23:0 &gt; Rain</a:t>
+            </a:r>
+          </a:p>
+          <a:p>
+            <a:r>
+              <a:t>FRI 2:0 &gt; Rain</a:t>
+            </a:r>
+          </a:p>
+          <a:p>
+            <a:r>
+              <a:t>FRI 5:0 &gt; Rain</a:t>
+            </a:r>
+          </a:p>
+          <a:p>
+            <a:r>
+              <a:t>FRI 8:0 &gt; Rain</a:t>
+            </a:r>
+          </a:p>
+          <a:p>
+            <a:r>
+              <a:t>FRI 11:0 &gt; Clouds</a:t>
+            </a:r>
+          </a:p>
+          <a:p>
+            <a:r>
+              <a:t>FRI 14:0 &gt; Clouds</a:t>
             </a:r>
           </a:p>
         </p:txBody>
@@ -5382,9 +5200,7 @@
         </p:nvSpPr>
         <p:spPr/>
         <p:txBody>
-          <a:bodyPr>
-            <a:normAutofit fontScale="85000" lnSpcReduction="10000"/>
-          </a:bodyPr>
+          <a:bodyPr/>
           <a:lstStyle/>
           <a:p>
             <a:r>

</xml_diff>